<commit_message>
Final Slides turned in
</commit_message>
<xml_diff>
--- a/John Nelson - DF15 - PowerPoint Presentation - Draft.pptx
+++ b/John Nelson - DF15 - PowerPoint Presentation - Draft.pptx
@@ -5,7 +5,7 @@
     <p:sldMasterId id="2147483681" r:id="rId1"/>
   </p:sldMasterIdLst>
   <p:notesMasterIdLst>
-    <p:notesMasterId r:id="rId27"/>
+    <p:notesMasterId r:id="rId28"/>
   </p:notesMasterIdLst>
   <p:sldIdLst>
     <p:sldId id="256" r:id="rId2"/>
@@ -33,6 +33,7 @@
     <p:sldId id="385" r:id="rId24"/>
     <p:sldId id="386" r:id="rId25"/>
     <p:sldId id="351" r:id="rId26"/>
+    <p:sldId id="394" r:id="rId27"/>
   </p:sldIdLst>
   <p:sldSz cx="12188825" cy="6858000"/>
   <p:notesSz cx="7010400" cy="9296400"/>
@@ -17816,6 +17817,163 @@
 </p:sld>
 </file>
 
+<file path=ppt/slides/slide26.xml><?xml version="1.0" encoding="utf-8"?>
+<p:sld xmlns:a="http://schemas.openxmlformats.org/drawingml/2006/main" xmlns:r="http://schemas.openxmlformats.org/officeDocument/2006/relationships" xmlns:p="http://schemas.openxmlformats.org/presentationml/2006/main">
+  <p:cSld>
+    <p:spTree>
+      <p:nvGrpSpPr>
+        <p:cNvPr id="1" name=""/>
+        <p:cNvGrpSpPr/>
+        <p:nvPr/>
+      </p:nvGrpSpPr>
+      <p:grpSpPr>
+        <a:xfrm>
+          <a:off x="0" y="0"/>
+          <a:ext cx="0" cy="0"/>
+          <a:chOff x="0" y="0"/>
+          <a:chExt cx="0" cy="0"/>
+        </a:xfrm>
+      </p:grpSpPr>
+      <p:sp>
+        <p:nvSpPr>
+          <p:cNvPr id="2" name="Title 1"/>
+          <p:cNvSpPr>
+            <a:spLocks noGrp="1"/>
+          </p:cNvSpPr>
+          <p:nvPr>
+            <p:ph type="title"/>
+          </p:nvPr>
+        </p:nvSpPr>
+        <p:spPr/>
+        <p:txBody>
+          <a:bodyPr/>
+          <a:lstStyle/>
+          <a:p>
+            <a:r>
+              <a:rPr lang="en-US" dirty="0" smtClean="0"/>
+              <a:t>Brief</a:t>
+            </a:r>
+            <a:endParaRPr lang="en-US" dirty="0"/>
+          </a:p>
+        </p:txBody>
+      </p:sp>
+      <p:sp>
+        <p:nvSpPr>
+          <p:cNvPr id="4" name="TextBox 3"/>
+          <p:cNvSpPr txBox="1"/>
+          <p:nvPr/>
+        </p:nvSpPr>
+        <p:spPr>
+          <a:xfrm>
+            <a:off x="1473200" y="1913467"/>
+            <a:ext cx="880369" cy="307777"/>
+          </a:xfrm>
+          <a:prstGeom prst="rect">
+            <a:avLst/>
+          </a:prstGeom>
+          <a:noFill/>
+        </p:spPr>
+        <p:txBody>
+          <a:bodyPr wrap="none" rtlCol="0">
+            <a:spAutoFit/>
+          </a:bodyPr>
+          <a:lstStyle/>
+          <a:p>
+            <a:r>
+              <a:rPr lang="en-US" dirty="0" smtClean="0"/>
+              <a:t>The Talk</a:t>
+            </a:r>
+            <a:endParaRPr lang="en-US" dirty="0"/>
+          </a:p>
+        </p:txBody>
+      </p:sp>
+      <p:sp>
+        <p:nvSpPr>
+          <p:cNvPr id="5" name="TextBox 4"/>
+          <p:cNvSpPr txBox="1"/>
+          <p:nvPr/>
+        </p:nvSpPr>
+        <p:spPr>
+          <a:xfrm>
+            <a:off x="8602133" y="2150533"/>
+            <a:ext cx="433132" cy="307777"/>
+          </a:xfrm>
+          <a:prstGeom prst="rect">
+            <a:avLst/>
+          </a:prstGeom>
+          <a:noFill/>
+        </p:spPr>
+        <p:txBody>
+          <a:bodyPr wrap="none" rtlCol="0">
+            <a:spAutoFit/>
+          </a:bodyPr>
+          <a:lstStyle/>
+          <a:p>
+            <a:r>
+              <a:rPr lang="en-US" dirty="0" smtClean="0"/>
+              <a:t>Me</a:t>
+            </a:r>
+            <a:endParaRPr lang="en-US" dirty="0"/>
+          </a:p>
+        </p:txBody>
+      </p:sp>
+      <p:sp>
+        <p:nvSpPr>
+          <p:cNvPr id="6" name="TextBox 5"/>
+          <p:cNvSpPr txBox="1"/>
+          <p:nvPr/>
+        </p:nvSpPr>
+        <p:spPr>
+          <a:xfrm>
+            <a:off x="8280400" y="2895600"/>
+            <a:ext cx="3708066" cy="523220"/>
+          </a:xfrm>
+          <a:prstGeom prst="rect">
+            <a:avLst/>
+          </a:prstGeom>
+          <a:noFill/>
+        </p:spPr>
+        <p:txBody>
+          <a:bodyPr wrap="none" rtlCol="0">
+            <a:spAutoFit/>
+          </a:bodyPr>
+          <a:lstStyle/>
+          <a:p>
+            <a:r>
+              <a:rPr lang="en-US" dirty="0" smtClean="0"/>
+              <a:t>John Nelson is a developer at </a:t>
+            </a:r>
+            <a:r>
+              <a:rPr lang="en-US" dirty="0" err="1" smtClean="0"/>
+              <a:t>CodeScience</a:t>
+            </a:r>
+            <a:r>
+              <a:rPr lang="en-US" dirty="0" smtClean="0"/>
+              <a:t>.</a:t>
+            </a:r>
+          </a:p>
+          <a:p>
+            <a:r>
+              <a:rPr lang="en-US" smtClean="0"/>
+              <a:t> </a:t>
+            </a:r>
+            <a:endParaRPr lang="en-US" dirty="0"/>
+          </a:p>
+        </p:txBody>
+      </p:sp>
+    </p:spTree>
+    <p:extLst>
+      <p:ext uri="{BB962C8B-B14F-4D97-AF65-F5344CB8AC3E}">
+        <p14:creationId xmlns:p14="http://schemas.microsoft.com/office/powerpoint/2010/main" val="1266069472"/>
+      </p:ext>
+    </p:extLst>
+  </p:cSld>
+  <p:clrMapOvr>
+    <a:masterClrMapping/>
+  </p:clrMapOvr>
+</p:sld>
+</file>
+
 <file path=ppt/slides/slide3.xml><?xml version="1.0" encoding="utf-8"?>
 <p:sld xmlns:a="http://schemas.openxmlformats.org/drawingml/2006/main" xmlns:r="http://schemas.openxmlformats.org/officeDocument/2006/relationships" xmlns:p="http://schemas.openxmlformats.org/presentationml/2006/main">
   <p:cSld>

</xml_diff>